<commit_message>
Made slight changes to presentation
</commit_message>
<xml_diff>
--- a/ims_presentation.pptx
+++ b/ims_presentation.pptx
@@ -139,6 +139,7 @@
 <file path=ppt/revisionInfo.xml><?xml version="1.0" encoding="utf-8"?>
 <p1510:revInfo xmlns:a="http://schemas.openxmlformats.org/drawingml/2006/main" xmlns:r="http://schemas.openxmlformats.org/officeDocument/2006/relationships" xmlns:p1510="http://schemas.microsoft.com/office/powerpoint/2015/10/main">
   <p1510:revLst>
+    <p1510:client id="{9C0FFD64-4ADF-4A1F-9961-0A5C96620716}" v="8" dt="2020-07-17T08:43:28.318"/>
     <p1510:client id="{A947AAF7-5806-49E5-8C46-0FE0AAF24C48}" v="47" dt="2020-07-16T20:26:31.596"/>
   </p1510:revLst>
 </p1510:revInfo>
@@ -146,6 +147,60 @@
 
 <file path=ppt/changesInfos/changesInfo1.xml><?xml version="1.0" encoding="utf-8"?>
 <pc:chgInfo xmlns:a="http://schemas.openxmlformats.org/drawingml/2006/main" xmlns:r="http://schemas.openxmlformats.org/officeDocument/2006/relationships" xmlns:ac="http://schemas.microsoft.com/office/drawing/2013/main/command" xmlns:pc="http://schemas.microsoft.com/office/powerpoint/2013/main/command">
+  <pc:docChgLst>
+    <pc:chgData name="Morgan Walsh" userId="cf4be0fd32a5ee03" providerId="LiveId" clId="{9C0FFD64-4ADF-4A1F-9961-0A5C96620716}"/>
+    <pc:docChg chg="modSld">
+      <pc:chgData name="Morgan Walsh" userId="cf4be0fd32a5ee03" providerId="LiveId" clId="{9C0FFD64-4ADF-4A1F-9961-0A5C96620716}" dt="2020-07-17T08:44:09.391" v="100" actId="20577"/>
+      <pc:docMkLst>
+        <pc:docMk/>
+      </pc:docMkLst>
+      <pc:sldChg chg="modSp mod">
+        <pc:chgData name="Morgan Walsh" userId="cf4be0fd32a5ee03" providerId="LiveId" clId="{9C0FFD64-4ADF-4A1F-9961-0A5C96620716}" dt="2020-07-17T08:43:07.925" v="5" actId="20577"/>
+        <pc:sldMkLst>
+          <pc:docMk/>
+          <pc:sldMk cId="1533229127" sldId="266"/>
+        </pc:sldMkLst>
+        <pc:spChg chg="mod">
+          <ac:chgData name="Morgan Walsh" userId="cf4be0fd32a5ee03" providerId="LiveId" clId="{9C0FFD64-4ADF-4A1F-9961-0A5C96620716}" dt="2020-07-17T08:43:07.925" v="5" actId="20577"/>
+          <ac:spMkLst>
+            <pc:docMk/>
+            <pc:sldMk cId="1533229127" sldId="266"/>
+            <ac:spMk id="3" creationId="{EB7227D3-783F-4F02-8653-35C1D0A1D87D}"/>
+          </ac:spMkLst>
+        </pc:spChg>
+      </pc:sldChg>
+      <pc:sldChg chg="modSp mod">
+        <pc:chgData name="Morgan Walsh" userId="cf4be0fd32a5ee03" providerId="LiveId" clId="{9C0FFD64-4ADF-4A1F-9961-0A5C96620716}" dt="2020-07-17T08:44:09.391" v="100" actId="20577"/>
+        <pc:sldMkLst>
+          <pc:docMk/>
+          <pc:sldMk cId="176036642" sldId="270"/>
+        </pc:sldMkLst>
+        <pc:spChg chg="mod">
+          <ac:chgData name="Morgan Walsh" userId="cf4be0fd32a5ee03" providerId="LiveId" clId="{9C0FFD64-4ADF-4A1F-9961-0A5C96620716}" dt="2020-07-17T08:44:09.391" v="100" actId="20577"/>
+          <ac:spMkLst>
+            <pc:docMk/>
+            <pc:sldMk cId="176036642" sldId="270"/>
+            <ac:spMk id="3" creationId="{2666442C-4077-4312-B6E8-C901C6F84D48}"/>
+          </ac:spMkLst>
+        </pc:spChg>
+      </pc:sldChg>
+      <pc:sldChg chg="modSp">
+        <pc:chgData name="Morgan Walsh" userId="cf4be0fd32a5ee03" providerId="LiveId" clId="{9C0FFD64-4ADF-4A1F-9961-0A5C96620716}" dt="2020-07-17T08:43:28.318" v="13" actId="20577"/>
+        <pc:sldMkLst>
+          <pc:docMk/>
+          <pc:sldMk cId="1286337448" sldId="271"/>
+        </pc:sldMkLst>
+        <pc:graphicFrameChg chg="mod">
+          <ac:chgData name="Morgan Walsh" userId="cf4be0fd32a5ee03" providerId="LiveId" clId="{9C0FFD64-4ADF-4A1F-9961-0A5C96620716}" dt="2020-07-17T08:43:28.318" v="13" actId="20577"/>
+          <ac:graphicFrameMkLst>
+            <pc:docMk/>
+            <pc:sldMk cId="1286337448" sldId="271"/>
+            <ac:graphicFrameMk id="18" creationId="{DC9531EF-1252-4A77-B977-214CA36DA0C8}"/>
+          </ac:graphicFrameMkLst>
+        </pc:graphicFrameChg>
+      </pc:sldChg>
+    </pc:docChg>
+  </pc:docChgLst>
   <pc:docChgLst>
     <pc:chgData name="Morgan Walsh" userId="cf4be0fd32a5ee03" providerId="LiveId" clId="{A947AAF7-5806-49E5-8C46-0FE0AAF24C48}"/>
     <pc:docChg chg="undo custSel mod addSld delSld modSld sldOrd">
@@ -2415,7 +2470,7 @@
 <dgm:dataModel xmlns:dgm="http://schemas.openxmlformats.org/drawingml/2006/diagram" xmlns:a="http://schemas.openxmlformats.org/drawingml/2006/main">
   <dgm:ptLst>
     <dgm:pt modelId="{E4E7036B-0AD8-4ABC-9365-2ADFB1211F91}" type="doc">
-      <dgm:prSet loTypeId="urn:microsoft.com/office/officeart/2005/8/layout/process1" loCatId="process" qsTypeId="urn:microsoft.com/office/officeart/2005/8/quickstyle/simple4" qsCatId="simple" csTypeId="urn:microsoft.com/office/officeart/2005/8/colors/colorful1" csCatId="colorful"/>
+      <dgm:prSet loTypeId="urn:microsoft.com/office/officeart/2005/8/layout/process1" loCatId="process" qsTypeId="urn:microsoft.com/office/officeart/2005/8/quickstyle/simple4" qsCatId="simple" csTypeId="urn:microsoft.com/office/officeart/2005/8/colors/colorful1" csCatId="colorful" phldr="1"/>
       <dgm:spPr/>
       <dgm:t>
         <a:bodyPr/>
@@ -2470,10 +2525,10 @@
         <a:lstStyle/>
         <a:p>
           <a:r>
-            <a:rPr lang="en-GB"/>
-            <a:t>Although testing was rough at first, upon the discovery that Junit could be used with a test database, I set to work at an astonishing pace; achieving a test coverage of 75.5%.</a:t>
+            <a:rPr lang="en-GB" dirty="0"/>
+            <a:t>Although testing was rough at first, upon the discovery that Junit could be used with a test database, I set to work at an astonishing pace; achieving a test coverage of 74.5%.</a:t>
           </a:r>
-          <a:endParaRPr lang="en-US"/>
+          <a:endParaRPr lang="en-US" dirty="0"/>
         </a:p>
       </dgm:t>
     </dgm:pt>
@@ -2895,10 +2950,10 @@
             <a:buNone/>
           </a:pPr>
           <a:r>
-            <a:rPr lang="en-GB" sz="1800" kern="1200"/>
-            <a:t>Although testing was rough at first, upon the discovery that Junit could be used with a test database, I set to work at an astonishing pace; achieving a test coverage of 75.5%.</a:t>
+            <a:rPr lang="en-GB" sz="1800" kern="1200" dirty="0"/>
+            <a:t>Although testing was rough at first, upon the discovery that Junit could be used with a test database, I set to work at an astonishing pace; achieving a test coverage of 74.5%.</a:t>
           </a:r>
-          <a:endParaRPr lang="en-US" sz="1800" kern="1200"/>
+          <a:endParaRPr lang="en-US" sz="1800" kern="1200" dirty="0"/>
         </a:p>
       </dsp:txBody>
       <dsp:txXfrm>
@@ -4371,7 +4426,7 @@
           <a:p>
             <a:fld id="{AF869721-F543-4A6C-BF9D-65D7CC540427}" type="datetimeFigureOut">
               <a:rPr lang="en-US" smtClean="0"/>
-              <a:t>7/16/2020</a:t>
+              <a:t>7/17/2020</a:t>
             </a:fld>
             <a:endParaRPr lang="en-US" dirty="0"/>
           </a:p>
@@ -4548,7 +4603,7 @@
           <a:p>
             <a:fld id="{C732326A-4C88-4AFB-AA5B-5919D81DFF5B}" type="datetimeFigureOut">
               <a:rPr lang="en-US" smtClean="0"/>
-              <a:t>7/16/2020</a:t>
+              <a:t>7/17/2020</a:t>
             </a:fld>
             <a:endParaRPr lang="en-US" dirty="0"/>
           </a:p>
@@ -5484,7 +5539,7 @@
             <a:fld id="{B61BEF0D-F0BB-DE4B-95CE-6DB70DBA9567}" type="datetimeFigureOut">
               <a:rPr lang="en-US" smtClean="0"/>
               <a:pPr/>
-              <a:t>7/16/2020</a:t>
+              <a:t>7/17/2020</a:t>
             </a:fld>
             <a:endParaRPr lang="en-US" dirty="0"/>
           </a:p>
@@ -5748,7 +5803,7 @@
             <a:fld id="{B61BEF0D-F0BB-DE4B-95CE-6DB70DBA9567}" type="datetimeFigureOut">
               <a:rPr lang="en-US" smtClean="0"/>
               <a:pPr/>
-              <a:t>7/16/2020</a:t>
+              <a:t>7/17/2020</a:t>
             </a:fld>
             <a:endParaRPr lang="en-US" dirty="0"/>
           </a:p>
@@ -5985,7 +6040,7 @@
             <a:fld id="{B61BEF0D-F0BB-DE4B-95CE-6DB70DBA9567}" type="datetimeFigureOut">
               <a:rPr lang="en-US" smtClean="0"/>
               <a:pPr/>
-              <a:t>7/16/2020</a:t>
+              <a:t>7/17/2020</a:t>
             </a:fld>
             <a:endParaRPr lang="en-US" dirty="0"/>
           </a:p>
@@ -6227,7 +6282,7 @@
             <a:fld id="{B61BEF0D-F0BB-DE4B-95CE-6DB70DBA9567}" type="datetimeFigureOut">
               <a:rPr lang="en-US" smtClean="0"/>
               <a:pPr/>
-              <a:t>7/16/2020</a:t>
+              <a:t>7/17/2020</a:t>
             </a:fld>
             <a:endParaRPr lang="en-US" dirty="0"/>
           </a:p>
@@ -6536,7 +6591,7 @@
             <a:fld id="{B61BEF0D-F0BB-DE4B-95CE-6DB70DBA9567}" type="datetimeFigureOut">
               <a:rPr lang="en-US" smtClean="0"/>
               <a:pPr/>
-              <a:t>7/16/2020</a:t>
+              <a:t>7/17/2020</a:t>
             </a:fld>
             <a:endParaRPr lang="en-US" dirty="0"/>
           </a:p>
@@ -6840,7 +6895,7 @@
             <a:fld id="{B61BEF0D-F0BB-DE4B-95CE-6DB70DBA9567}" type="datetimeFigureOut">
               <a:rPr lang="en-US" smtClean="0"/>
               <a:pPr/>
-              <a:t>7/16/2020</a:t>
+              <a:t>7/17/2020</a:t>
             </a:fld>
             <a:endParaRPr lang="en-US" dirty="0"/>
           </a:p>
@@ -7264,7 +7319,7 @@
             <a:fld id="{B61BEF0D-F0BB-DE4B-95CE-6DB70DBA9567}" type="datetimeFigureOut">
               <a:rPr lang="en-US" smtClean="0"/>
               <a:pPr/>
-              <a:t>7/16/2020</a:t>
+              <a:t>7/17/2020</a:t>
             </a:fld>
             <a:endParaRPr lang="en-US" dirty="0"/>
           </a:p>
@@ -7361,7 +7416,7 @@
             <a:fld id="{B61BEF0D-F0BB-DE4B-95CE-6DB70DBA9567}" type="datetimeFigureOut">
               <a:rPr lang="en-US" smtClean="0"/>
               <a:pPr/>
-              <a:t>7/16/2020</a:t>
+              <a:t>7/17/2020</a:t>
             </a:fld>
             <a:endParaRPr lang="en-US" dirty="0"/>
           </a:p>
@@ -7525,7 +7580,7 @@
             <a:fld id="{B61BEF0D-F0BB-DE4B-95CE-6DB70DBA9567}" type="datetimeFigureOut">
               <a:rPr lang="en-US" smtClean="0"/>
               <a:pPr/>
-              <a:t>7/16/2020</a:t>
+              <a:t>7/17/2020</a:t>
             </a:fld>
             <a:endParaRPr lang="en-US" dirty="0"/>
           </a:p>
@@ -7905,7 +7960,7 @@
             <a:fld id="{B61BEF0D-F0BB-DE4B-95CE-6DB70DBA9567}" type="datetimeFigureOut">
               <a:rPr lang="en-US" smtClean="0"/>
               <a:pPr/>
-              <a:t>7/16/2020</a:t>
+              <a:t>7/17/2020</a:t>
             </a:fld>
             <a:endParaRPr lang="en-US" dirty="0"/>
           </a:p>
@@ -8196,7 +8251,7 @@
             <a:fld id="{B61BEF0D-F0BB-DE4B-95CE-6DB70DBA9567}" type="datetimeFigureOut">
               <a:rPr lang="en-US" smtClean="0"/>
               <a:pPr/>
-              <a:t>7/16/2020</a:t>
+              <a:t>7/17/2020</a:t>
             </a:fld>
             <a:endParaRPr lang="en-US" dirty="0"/>
           </a:p>
@@ -8409,7 +8464,7 @@
             <a:fld id="{B61BEF0D-F0BB-DE4B-95CE-6DB70DBA9567}" type="datetimeFigureOut">
               <a:rPr lang="en-US" smtClean="0"/>
               <a:pPr/>
-              <a:t>7/16/2020</a:t>
+              <a:t>7/17/2020</a:t>
             </a:fld>
             <a:endParaRPr lang="en-US" dirty="0"/>
           </a:p>
@@ -9972,7 +10027,7 @@
             </a:pPr>
             <a:r>
               <a:rPr lang="en-GB" dirty="0"/>
-              <a:t>Once my unit tests passed, at a coverage of 75.5% (Originally ≈ 81.0%), I started my presentation building.</a:t>
+              <a:t>Once my unit tests passed, at a coverage of 74.5% (Originally ≈ 81.0%), I started my presentation building.</a:t>
             </a:r>
           </a:p>
           <a:p>
@@ -10497,25 +10552,46 @@
           <a:lstStyle/>
           <a:p>
             <a:r>
-              <a:rPr lang="en-GB"/>
-              <a:t>My calculateCost() method does not function as intended, instead returning 0 rather then iterating over the ItemSet as intended. This requires me to improve my debugging abilities.</a:t>
+              <a:rPr lang="en-GB" dirty="0"/>
+              <a:t>My </a:t>
             </a:r>
-          </a:p>
-          <a:p>
-            <a:endParaRPr lang="en-GB"/>
-          </a:p>
-          <a:p>
+            <a:r>
+              <a:rPr lang="en-GB" dirty="0" err="1"/>
+              <a:t>calculateCost</a:t>
+            </a:r>
+            <a:r>
+              <a:rPr lang="en-GB" dirty="0"/>
+              <a:t>() method did not function as intended, instead returning 0 rather then iterating over the </a:t>
+            </a:r>
+            <a:r>
+              <a:rPr lang="en-GB" dirty="0" err="1"/>
+              <a:t>ItemSet</a:t>
+            </a:r>
+            <a:r>
+              <a:rPr lang="en-GB" dirty="0"/>
+              <a:t> as intended. This requires me to improve my debugging abilities, although I quickly managed to solve the problem 30 minutes before the </a:t>
+            </a:r>
             <a:r>
               <a:rPr lang="en-GB"/>
+              <a:t>due time :D</a:t>
+            </a:r>
+            <a:endParaRPr lang="en-GB" dirty="0"/>
+          </a:p>
+          <a:p>
+            <a:endParaRPr lang="en-GB" dirty="0"/>
+          </a:p>
+          <a:p>
+            <a:r>
+              <a:rPr lang="en-GB" dirty="0"/>
               <a:t>At times, I felt like I was not ‘standing on my own two feet’, in the proverbial sense. At other times, I felt like it flew by. I feel this is likely due to not poor, but not great planning and failure to get Planning Poker to function; thus reducing my ability to gauge a tasks difficulty prior to starting.</a:t>
             </a:r>
           </a:p>
           <a:p>
-            <a:endParaRPr lang="en-GB"/>
+            <a:endParaRPr lang="en-GB" dirty="0"/>
           </a:p>
           <a:p>
             <a:r>
-              <a:rPr lang="en-GB"/>
+              <a:rPr lang="en-GB" dirty="0"/>
               <a:t>Testing was a rough process at first, as I struggled to get Mockito functioning.</a:t>
             </a:r>
           </a:p>
@@ -10907,7 +10983,7 @@
             <p:ph idx="1"/>
             <p:extLst>
               <p:ext uri="{D42A27DB-BD31-4B8C-83A1-F6EECF244321}">
-                <p14:modId xmlns:p14="http://schemas.microsoft.com/office/powerpoint/2010/main" val="3687037473"/>
+                <p14:modId xmlns:p14="http://schemas.microsoft.com/office/powerpoint/2010/main" val="2367508516"/>
               </p:ext>
             </p:extLst>
           </p:nvPr>
@@ -17966,6 +18042,15 @@
 </file>
 
 <file path=customXml/item1.xml><?xml version="1.0" encoding="utf-8"?>
+<p:properties xmlns:p="http://schemas.microsoft.com/office/2006/metadata/properties" xmlns:xsi="http://www.w3.org/2001/XMLSchema-instance" xmlns:pc="http://schemas.microsoft.com/office/infopath/2007/PartnerControls">
+  <documentManagement>
+    <Status xmlns="71af3243-3dd4-4a8d-8c0d-dd76da1f02a5">Not started</Status>
+    <MediaServiceKeyPoints xmlns="71af3243-3dd4-4a8d-8c0d-dd76da1f02a5" xsi:nil="true"/>
+  </documentManagement>
+</p:properties>
+</file>
+
+<file path=customXml/item2.xml><?xml version="1.0" encoding="utf-8"?>
 <ct:contentTypeSchema xmlns:ct="http://schemas.microsoft.com/office/2006/metadata/contentType" xmlns:ma="http://schemas.microsoft.com/office/2006/metadata/properties/metaAttributes" ct:_="" ma:_="" ma:contentTypeName="Document" ma:contentTypeID="0x01010079F111ED35F8CC479449609E8A0923A6" ma:contentTypeVersion="12" ma:contentTypeDescription="Create a new document." ma:contentTypeScope="" ma:versionID="93813dd7ca6ad654711aa0ab317e03a3">
   <xsd:schema xmlns:xsd="http://www.w3.org/2001/XMLSchema" xmlns:xs="http://www.w3.org/2001/XMLSchema" xmlns:p="http://schemas.microsoft.com/office/2006/metadata/properties" xmlns:ns2="71af3243-3dd4-4a8d-8c0d-dd76da1f02a5" xmlns:ns3="16c05727-aa75-4e4a-9b5f-8a80a1165891" targetNamespace="http://schemas.microsoft.com/office/2006/metadata/properties" ma:root="true" ma:fieldsID="f11dc0ce689dd3925e84e4e35398c6e7" ns2:_="" ns3:_="">
     <xsd:import namespace="71af3243-3dd4-4a8d-8c0d-dd76da1f02a5"/>
@@ -18186,15 +18271,6 @@
 </ct:contentTypeSchema>
 </file>
 
-<file path=customXml/item2.xml><?xml version="1.0" encoding="utf-8"?>
-<p:properties xmlns:p="http://schemas.microsoft.com/office/2006/metadata/properties" xmlns:xsi="http://www.w3.org/2001/XMLSchema-instance" xmlns:pc="http://schemas.microsoft.com/office/infopath/2007/PartnerControls">
-  <documentManagement>
-    <Status xmlns="71af3243-3dd4-4a8d-8c0d-dd76da1f02a5">Not started</Status>
-    <MediaServiceKeyPoints xmlns="71af3243-3dd4-4a8d-8c0d-dd76da1f02a5" xsi:nil="true"/>
-  </documentManagement>
-</p:properties>
-</file>
-
 <file path=customXml/item3.xml><?xml version="1.0" encoding="utf-8"?>
 <?mso-contentType ?>
 <FormTemplates xmlns="http://schemas.microsoft.com/sharepoint/v3/contenttype/forms">
@@ -18205,6 +18281,16 @@
 </file>
 
 <file path=customXml/itemProps1.xml><?xml version="1.0" encoding="utf-8"?>
+<ds:datastoreItem xmlns:ds="http://schemas.openxmlformats.org/officeDocument/2006/customXml" ds:itemID="{55B48092-4A2C-4E16-B971-9ACADFFF69E4}">
+  <ds:schemaRefs>
+    <ds:schemaRef ds:uri="http://schemas.microsoft.com/office/2006/metadata/properties"/>
+    <ds:schemaRef ds:uri="http://schemas.microsoft.com/office/infopath/2007/PartnerControls"/>
+    <ds:schemaRef ds:uri="71af3243-3dd4-4a8d-8c0d-dd76da1f02a5"/>
+  </ds:schemaRefs>
+</ds:datastoreItem>
+</file>
+
+<file path=customXml/itemProps2.xml><?xml version="1.0" encoding="utf-8"?>
 <ds:datastoreItem xmlns:ds="http://schemas.openxmlformats.org/officeDocument/2006/customXml" ds:itemID="{E503B719-B9A6-4DC9-AA9D-06F16B758BCB}">
   <ds:schemaRefs>
     <ds:schemaRef ds:uri="http://schemas.microsoft.com/office/2006/metadata/contentType"/>
@@ -18223,16 +18309,6 @@
 </ds:datastoreItem>
 </file>
 
-<file path=customXml/itemProps2.xml><?xml version="1.0" encoding="utf-8"?>
-<ds:datastoreItem xmlns:ds="http://schemas.openxmlformats.org/officeDocument/2006/customXml" ds:itemID="{55B48092-4A2C-4E16-B971-9ACADFFF69E4}">
-  <ds:schemaRefs>
-    <ds:schemaRef ds:uri="http://schemas.microsoft.com/office/2006/metadata/properties"/>
-    <ds:schemaRef ds:uri="http://schemas.microsoft.com/office/infopath/2007/PartnerControls"/>
-    <ds:schemaRef ds:uri="71af3243-3dd4-4a8d-8c0d-dd76da1f02a5"/>
-  </ds:schemaRefs>
-</ds:datastoreItem>
-</file>
-
 <file path=customXml/itemProps3.xml><?xml version="1.0" encoding="utf-8"?>
 <ds:datastoreItem xmlns:ds="http://schemas.openxmlformats.org/officeDocument/2006/customXml" ds:itemID="{3E586370-B0FB-4108-8B4F-329716A22E3A}">
   <ds:schemaRefs>

</xml_diff>